<commit_message>
add pptx support for horizontal slide
</commit_message>
<xml_diff>
--- a/cotizaciones/test.pptx
+++ b/cotizaciones/test.pptx
@@ -6,6 +6,8 @@
   </p:sldMasterIdLst>
   <p:sldIdLst>
     <p:sldId id="256" r:id="rId7"/>
+    <p:sldId id="257" r:id="rId8"/>
+    <p:sldId id="258" r:id="rId9"/>
   </p:sldIdLst>
   <p:sldSz cx="9144000" cy="6858000" type="screen4x3"/>
   <p:notesSz cx="6858000" cy="9144000"/>
@@ -3261,6 +3263,110 @@
               <a:t>Inversiones Lazus</a:t>
             </a:r>
           </a:p>
+        </p:txBody>
+      </p:sp>
+    </p:spTree>
+  </p:cSld>
+  <p:clrMapOvr>
+    <a:masterClrMapping/>
+  </p:clrMapOvr>
+</p:sld>
+</file>
+
+<file path=ppt/slides/slide2.xml><?xml version="1.0" encoding="utf-8"?>
+<p:sld xmlns:a="http://schemas.openxmlformats.org/drawingml/2006/main" xmlns:p="http://schemas.openxmlformats.org/presentationml/2006/main" xmlns:r="http://schemas.openxmlformats.org/officeDocument/2006/relationships">
+  <p:cSld>
+    <p:spTree>
+      <p:nvGrpSpPr>
+        <p:cNvPr id="1" name=""/>
+        <p:cNvGrpSpPr/>
+        <p:nvPr/>
+      </p:nvGrpSpPr>
+      <p:grpSpPr/>
+      <p:sp>
+        <p:nvSpPr>
+          <p:cNvPr id="2" name="Title 1"/>
+          <p:cNvSpPr>
+            <a:spLocks noGrp="1"/>
+          </p:cNvSpPr>
+          <p:nvPr>
+            <p:ph type="ctrTitle"/>
+          </p:nvPr>
+        </p:nvSpPr>
+        <p:spPr/>
+        <p:txBody>
+          <a:bodyPr/>
+          <a:lstStyle/>
+          <a:p/>
+        </p:txBody>
+      </p:sp>
+      <p:sp>
+        <p:nvSpPr>
+          <p:cNvPr id="3" name="Subtitle 2"/>
+          <p:cNvSpPr>
+            <a:spLocks noGrp="1"/>
+          </p:cNvSpPr>
+          <p:nvPr>
+            <p:ph type="subTitle" idx="1"/>
+          </p:nvPr>
+        </p:nvSpPr>
+        <p:spPr/>
+        <p:txBody>
+          <a:bodyPr/>
+          <a:lstStyle/>
+          <a:p/>
+        </p:txBody>
+      </p:sp>
+    </p:spTree>
+  </p:cSld>
+  <p:clrMapOvr>
+    <a:masterClrMapping/>
+  </p:clrMapOvr>
+</p:sld>
+</file>
+
+<file path=ppt/slides/slide3.xml><?xml version="1.0" encoding="utf-8"?>
+<p:sld xmlns:a="http://schemas.openxmlformats.org/drawingml/2006/main" xmlns:p="http://schemas.openxmlformats.org/presentationml/2006/main" xmlns:r="http://schemas.openxmlformats.org/officeDocument/2006/relationships">
+  <p:cSld>
+    <p:spTree>
+      <p:nvGrpSpPr>
+        <p:cNvPr id="1" name=""/>
+        <p:cNvGrpSpPr/>
+        <p:nvPr/>
+      </p:nvGrpSpPr>
+      <p:grpSpPr/>
+      <p:sp>
+        <p:nvSpPr>
+          <p:cNvPr id="2" name="Title 1"/>
+          <p:cNvSpPr>
+            <a:spLocks noGrp="1"/>
+          </p:cNvSpPr>
+          <p:nvPr>
+            <p:ph type="ctrTitle"/>
+          </p:nvPr>
+        </p:nvSpPr>
+        <p:spPr/>
+        <p:txBody>
+          <a:bodyPr/>
+          <a:lstStyle/>
+          <a:p/>
+        </p:txBody>
+      </p:sp>
+      <p:sp>
+        <p:nvSpPr>
+          <p:cNvPr id="3" name="Subtitle 2"/>
+          <p:cNvSpPr>
+            <a:spLocks noGrp="1"/>
+          </p:cNvSpPr>
+          <p:nvPr>
+            <p:ph type="subTitle" idx="1"/>
+          </p:nvPr>
+        </p:nvSpPr>
+        <p:spPr/>
+        <p:txBody>
+          <a:bodyPr/>
+          <a:lstStyle/>
+          <a:p/>
         </p:txBody>
       </p:sp>
     </p:spTree>

</xml_diff>